<commit_message>
Incremental commit of presentation
</commit_message>
<xml_diff>
--- a/RESTful API the HATEOAS Way.pptx
+++ b/RESTful API the HATEOAS Way.pptx
@@ -6,6 +6,7 @@
   </p:sldMasterIdLst>
   <p:sldIdLst>
     <p:sldId id="256" r:id="rId2"/>
+    <p:sldId id="257" r:id="rId3"/>
   </p:sldIdLst>
   <p:sldSz cx="12192000" cy="6858000"/>
   <p:notesSz cx="6858000" cy="9144000"/>
@@ -104,6 +105,11 @@
       </a:defRPr>
     </a:lvl9pPr>
   </p:defaultTextStyle>
+  <p:extLst>
+    <p:ext uri="{EFAFB233-063F-42B5-8137-9DF3F51BA10A}">
+      <p15:sldGuideLst xmlns:p15="http://schemas.microsoft.com/office/powerpoint/2012/main"/>
+    </p:ext>
+  </p:extLst>
 </p:presentation>
 </file>
 
@@ -5811,6 +5817,159 @@
 </p:sld>
 </file>
 
+<file path=ppt/slides/slide2.xml><?xml version="1.0" encoding="utf-8"?>
+<p:sld xmlns:a="http://schemas.openxmlformats.org/drawingml/2006/main" xmlns:r="http://schemas.openxmlformats.org/officeDocument/2006/relationships" xmlns:p="http://schemas.openxmlformats.org/presentationml/2006/main">
+  <p:cSld>
+    <p:spTree>
+      <p:nvGrpSpPr>
+        <p:cNvPr id="1" name=""/>
+        <p:cNvGrpSpPr/>
+        <p:nvPr/>
+      </p:nvGrpSpPr>
+      <p:grpSpPr>
+        <a:xfrm>
+          <a:off x="0" y="0"/>
+          <a:ext cx="0" cy="0"/>
+          <a:chOff x="0" y="0"/>
+          <a:chExt cx="0" cy="0"/>
+        </a:xfrm>
+      </p:grpSpPr>
+      <p:sp>
+        <p:nvSpPr>
+          <p:cNvPr id="2" name="Title 1">
+            <a:extLst>
+              <a:ext uri="{FF2B5EF4-FFF2-40B4-BE49-F238E27FC236}">
+                <a16:creationId xmlns:a16="http://schemas.microsoft.com/office/drawing/2014/main" id="{DA546F4E-3ED2-4F0C-8361-381E00F8C317}"/>
+              </a:ext>
+            </a:extLst>
+          </p:cNvPr>
+          <p:cNvSpPr>
+            <a:spLocks noGrp="1"/>
+          </p:cNvSpPr>
+          <p:nvPr>
+            <p:ph type="title"/>
+          </p:nvPr>
+        </p:nvSpPr>
+        <p:spPr/>
+        <p:txBody>
+          <a:bodyPr/>
+          <a:lstStyle/>
+          <a:p>
+            <a:r>
+              <a:rPr lang="en-US" dirty="0"/>
+              <a:t>A little history first</a:t>
+            </a:r>
+          </a:p>
+        </p:txBody>
+      </p:sp>
+      <p:sp>
+        <p:nvSpPr>
+          <p:cNvPr id="3" name="Content Placeholder 2">
+            <a:extLst>
+              <a:ext uri="{FF2B5EF4-FFF2-40B4-BE49-F238E27FC236}">
+                <a16:creationId xmlns:a16="http://schemas.microsoft.com/office/drawing/2014/main" id="{F9FE73F2-239E-4826-81FE-7F7FB0E66E0A}"/>
+              </a:ext>
+            </a:extLst>
+          </p:cNvPr>
+          <p:cNvSpPr>
+            <a:spLocks noGrp="1"/>
+          </p:cNvSpPr>
+          <p:nvPr>
+            <p:ph idx="1"/>
+          </p:nvPr>
+        </p:nvSpPr>
+        <p:spPr/>
+        <p:txBody>
+          <a:bodyPr/>
+          <a:lstStyle/>
+          <a:p>
+            <a:r>
+              <a:rPr lang="en-US" dirty="0"/>
+              <a:t>So about 20 years ago Roy Thomas Fielding submitted his PhD dissertation paper on “</a:t>
+            </a:r>
+            <a:r>
+              <a:rPr lang="en-US" dirty="0">
+                <a:hlinkClick r:id="rId2"/>
+              </a:rPr>
+              <a:t>Architectural Styles and the Design of Network-based Software Architectures</a:t>
+            </a:r>
+            <a:r>
+              <a:rPr lang="en-US" dirty="0"/>
+              <a:t>”.  There is much controversy today about this.  But it is generally accepted that this is the foundational document of what we call  REST. </a:t>
+            </a:r>
+          </a:p>
+          <a:p>
+            <a:r>
+              <a:rPr lang="en-US" dirty="0"/>
+              <a:t>Roy was not just some PhD student in 1994, he began working at and for the World Wide Web Consortium.</a:t>
+            </a:r>
+          </a:p>
+          <a:p>
+            <a:r>
+              <a:rPr lang="en-US" dirty="0"/>
+              <a:t>He co-authored the </a:t>
+            </a:r>
+            <a:r>
+              <a:rPr lang="en-US" dirty="0">
+                <a:hlinkClick r:id="rId3"/>
+              </a:rPr>
+              <a:t>HTTP 1.0 specification</a:t>
+            </a:r>
+            <a:r>
+              <a:rPr lang="en-US" dirty="0"/>
+              <a:t> in 1996.</a:t>
+            </a:r>
+          </a:p>
+          <a:p>
+            <a:r>
+              <a:rPr lang="en-US" dirty="0"/>
+              <a:t>Whose other claim to fame is having </a:t>
+            </a:r>
+            <a:r>
+              <a:rPr lang="en-US" dirty="0">
+                <a:hlinkClick r:id="rId4"/>
+              </a:rPr>
+              <a:t>co-founded</a:t>
+            </a:r>
+            <a:r>
+              <a:rPr lang="en-US" dirty="0"/>
+              <a:t> the </a:t>
+            </a:r>
+            <a:r>
+              <a:rPr lang="en-US" dirty="0">
+                <a:hlinkClick r:id="rId5"/>
+              </a:rPr>
+              <a:t>Apache web server project</a:t>
+            </a:r>
+            <a:r>
+              <a:rPr lang="en-US" dirty="0"/>
+              <a:t>.</a:t>
+            </a:r>
+          </a:p>
+          <a:p>
+            <a:pPr marL="0" indent="0">
+              <a:buNone/>
+            </a:pPr>
+            <a:endParaRPr lang="en-US" dirty="0"/>
+          </a:p>
+          <a:p>
+            <a:endParaRPr lang="en-US" dirty="0"/>
+          </a:p>
+        </p:txBody>
+      </p:sp>
+    </p:spTree>
+    <p:extLst>
+      <p:ext uri="{BB962C8B-B14F-4D97-AF65-F5344CB8AC3E}">
+        <p14:creationId xmlns:p14="http://schemas.microsoft.com/office/powerpoint/2010/main" val="2749696157"/>
+      </p:ext>
+    </p:extLst>
+  </p:cSld>
+  <p:clrMapOvr>
+    <a:masterClrMapping/>
+  </p:clrMapOvr>
+</p:sld>
+</file>
+
 <file path=ppt/theme/theme1.xml><?xml version="1.0" encoding="utf-8"?>
 <a:theme xmlns:a="http://schemas.openxmlformats.org/drawingml/2006/main" name="Vapor Trail">
   <a:themeElements>

</xml_diff>

<commit_message>
Added presentation as PPTX and PDF
</commit_message>
<xml_diff>
--- a/RESTful API the HATEOAS Way.pptx
+++ b/RESTful API the HATEOAS Way.pptx
@@ -21,7 +21,8 @@
     <p:sldId id="269" r:id="rId15"/>
     <p:sldId id="270" r:id="rId16"/>
     <p:sldId id="271" r:id="rId17"/>
-    <p:sldId id="272" r:id="rId18"/>
+    <p:sldId id="273" r:id="rId18"/>
+    <p:sldId id="272" r:id="rId19"/>
   </p:sldIdLst>
   <p:sldSz cx="12192000" cy="6858000"/>
   <p:notesSz cx="6858000" cy="9144000"/>
@@ -298,7 +299,7 @@
           <a:p>
             <a:fld id="{C7A840F7-D6A1-40E9-8C2B-38F65D11C884}" type="datetimeFigureOut">
               <a:rPr lang="en-US" smtClean="0"/>
-              <a:t>7/4/2021</a:t>
+              <a:t>7/5/2021</a:t>
             </a:fld>
             <a:endParaRPr lang="en-US"/>
           </a:p>
@@ -565,7 +566,7 @@
           <a:p>
             <a:fld id="{C7A840F7-D6A1-40E9-8C2B-38F65D11C884}" type="datetimeFigureOut">
               <a:rPr lang="en-US" smtClean="0"/>
-              <a:t>7/4/2021</a:t>
+              <a:t>7/5/2021</a:t>
             </a:fld>
             <a:endParaRPr lang="en-US"/>
           </a:p>
@@ -796,7 +797,7 @@
           <a:p>
             <a:fld id="{C7A840F7-D6A1-40E9-8C2B-38F65D11C884}" type="datetimeFigureOut">
               <a:rPr lang="en-US" smtClean="0"/>
-              <a:t>7/4/2021</a:t>
+              <a:t>7/5/2021</a:t>
             </a:fld>
             <a:endParaRPr lang="en-US"/>
           </a:p>
@@ -1106,7 +1107,7 @@
           <a:p>
             <a:fld id="{C7A840F7-D6A1-40E9-8C2B-38F65D11C884}" type="datetimeFigureOut">
               <a:rPr lang="en-US" smtClean="0"/>
-              <a:t>7/4/2021</a:t>
+              <a:t>7/5/2021</a:t>
             </a:fld>
             <a:endParaRPr lang="en-US"/>
           </a:p>
@@ -1579,7 +1580,7 @@
           <a:p>
             <a:fld id="{C7A840F7-D6A1-40E9-8C2B-38F65D11C884}" type="datetimeFigureOut">
               <a:rPr lang="en-US" smtClean="0"/>
-              <a:t>7/4/2021</a:t>
+              <a:t>7/5/2021</a:t>
             </a:fld>
             <a:endParaRPr lang="en-US"/>
           </a:p>
@@ -2126,7 +2127,7 @@
           <a:p>
             <a:fld id="{C7A840F7-D6A1-40E9-8C2B-38F65D11C884}" type="datetimeFigureOut">
               <a:rPr lang="en-US" smtClean="0"/>
-              <a:t>7/4/2021</a:t>
+              <a:t>7/5/2021</a:t>
             </a:fld>
             <a:endParaRPr lang="en-US"/>
           </a:p>
@@ -2900,7 +2901,7 @@
           <a:p>
             <a:fld id="{C7A840F7-D6A1-40E9-8C2B-38F65D11C884}" type="datetimeFigureOut">
               <a:rPr lang="en-US" smtClean="0"/>
-              <a:t>7/4/2021</a:t>
+              <a:t>7/5/2021</a:t>
             </a:fld>
             <a:endParaRPr lang="en-US"/>
           </a:p>
@@ -3075,7 +3076,7 @@
           <a:p>
             <a:fld id="{C7A840F7-D6A1-40E9-8C2B-38F65D11C884}" type="datetimeFigureOut">
               <a:rPr lang="en-US" smtClean="0"/>
-              <a:t>7/4/2021</a:t>
+              <a:t>7/5/2021</a:t>
             </a:fld>
             <a:endParaRPr lang="en-US"/>
           </a:p>
@@ -3298,7 +3299,7 @@
           <a:p>
             <a:fld id="{C7A840F7-D6A1-40E9-8C2B-38F65D11C884}" type="datetimeFigureOut">
               <a:rPr lang="en-US" smtClean="0"/>
-              <a:t>7/4/2021</a:t>
+              <a:t>7/5/2021</a:t>
             </a:fld>
             <a:endParaRPr lang="en-US"/>
           </a:p>
@@ -3478,7 +3479,7 @@
           <a:p>
             <a:fld id="{C7A840F7-D6A1-40E9-8C2B-38F65D11C884}" type="datetimeFigureOut">
               <a:rPr lang="en-US" smtClean="0"/>
-              <a:t>7/4/2021</a:t>
+              <a:t>7/5/2021</a:t>
             </a:fld>
             <a:endParaRPr lang="en-US"/>
           </a:p>
@@ -3767,7 +3768,7 @@
           <a:p>
             <a:fld id="{C7A840F7-D6A1-40E9-8C2B-38F65D11C884}" type="datetimeFigureOut">
               <a:rPr lang="en-US" smtClean="0"/>
-              <a:t>7/4/2021</a:t>
+              <a:t>7/5/2021</a:t>
             </a:fld>
             <a:endParaRPr lang="en-US"/>
           </a:p>
@@ -4009,7 +4010,7 @@
           <a:p>
             <a:fld id="{C7A840F7-D6A1-40E9-8C2B-38F65D11C884}" type="datetimeFigureOut">
               <a:rPr lang="en-US" smtClean="0"/>
-              <a:t>7/4/2021</a:t>
+              <a:t>7/5/2021</a:t>
             </a:fld>
             <a:endParaRPr lang="en-US"/>
           </a:p>
@@ -4388,7 +4389,7 @@
           <a:p>
             <a:fld id="{C7A840F7-D6A1-40E9-8C2B-38F65D11C884}" type="datetimeFigureOut">
               <a:rPr lang="en-US" smtClean="0"/>
-              <a:t>7/4/2021</a:t>
+              <a:t>7/5/2021</a:t>
             </a:fld>
             <a:endParaRPr lang="en-US"/>
           </a:p>
@@ -4506,7 +4507,7 @@
           <a:p>
             <a:fld id="{C7A840F7-D6A1-40E9-8C2B-38F65D11C884}" type="datetimeFigureOut">
               <a:rPr lang="en-US" smtClean="0"/>
-              <a:t>7/4/2021</a:t>
+              <a:t>7/5/2021</a:t>
             </a:fld>
             <a:endParaRPr lang="en-US"/>
           </a:p>
@@ -4601,7 +4602,7 @@
           <a:p>
             <a:fld id="{C7A840F7-D6A1-40E9-8C2B-38F65D11C884}" type="datetimeFigureOut">
               <a:rPr lang="en-US" smtClean="0"/>
-              <a:t>7/4/2021</a:t>
+              <a:t>7/5/2021</a:t>
             </a:fld>
             <a:endParaRPr lang="en-US"/>
           </a:p>
@@ -4850,7 +4851,7 @@
           <a:p>
             <a:fld id="{C7A840F7-D6A1-40E9-8C2B-38F65D11C884}" type="datetimeFigureOut">
               <a:rPr lang="en-US" smtClean="0"/>
-              <a:t>7/4/2021</a:t>
+              <a:t>7/5/2021</a:t>
             </a:fld>
             <a:endParaRPr lang="en-US"/>
           </a:p>
@@ -5107,7 +5108,7 @@
           <a:p>
             <a:fld id="{C7A840F7-D6A1-40E9-8C2B-38F65D11C884}" type="datetimeFigureOut">
               <a:rPr lang="en-US" smtClean="0"/>
-              <a:t>7/4/2021</a:t>
+              <a:t>7/5/2021</a:t>
             </a:fld>
             <a:endParaRPr lang="en-US"/>
           </a:p>
@@ -5350,7 +5351,7 @@
           <a:p>
             <a:fld id="{C7A840F7-D6A1-40E9-8C2B-38F65D11C884}" type="datetimeFigureOut">
               <a:rPr lang="en-US" smtClean="0"/>
-              <a:t>7/4/2021</a:t>
+              <a:t>7/5/2021</a:t>
             </a:fld>
             <a:endParaRPr lang="en-US"/>
           </a:p>
@@ -6897,6 +6898,99 @@
           <p:cNvPr id="2" name="Title 1">
             <a:extLst>
               <a:ext uri="{FF2B5EF4-FFF2-40B4-BE49-F238E27FC236}">
+                <a16:creationId xmlns:a16="http://schemas.microsoft.com/office/drawing/2014/main" id="{E63341C9-F370-473C-BEE9-84C30E1DB058}"/>
+              </a:ext>
+            </a:extLst>
+          </p:cNvPr>
+          <p:cNvSpPr>
+            <a:spLocks noGrp="1"/>
+          </p:cNvSpPr>
+          <p:nvPr>
+            <p:ph type="title"/>
+          </p:nvPr>
+        </p:nvSpPr>
+        <p:spPr/>
+        <p:txBody>
+          <a:bodyPr/>
+          <a:lstStyle/>
+          <a:p>
+            <a:r>
+              <a:rPr lang="en-US" dirty="0"/>
+              <a:t>Any questions</a:t>
+            </a:r>
+          </a:p>
+        </p:txBody>
+      </p:sp>
+      <p:pic>
+        <p:nvPicPr>
+          <p:cNvPr id="5" name="Content Placeholder 4">
+            <a:extLst>
+              <a:ext uri="{FF2B5EF4-FFF2-40B4-BE49-F238E27FC236}">
+                <a16:creationId xmlns:a16="http://schemas.microsoft.com/office/drawing/2014/main" id="{52AE9388-309F-464E-B4FF-3D177B47729F}"/>
+              </a:ext>
+            </a:extLst>
+          </p:cNvPr>
+          <p:cNvPicPr>
+            <a:picLocks noGrp="1" noChangeAspect="1"/>
+          </p:cNvPicPr>
+          <p:nvPr>
+            <p:ph idx="1"/>
+          </p:nvPr>
+        </p:nvPicPr>
+        <p:blipFill>
+          <a:blip r:embed="rId2">
+            <a:extLst>
+              <a:ext uri="{28A0092B-C50C-407E-A947-70E740481C1C}">
+                <a14:useLocalDpi xmlns:a14="http://schemas.microsoft.com/office/drawing/2010/main" val="0"/>
+              </a:ext>
+            </a:extLst>
+          </a:blip>
+          <a:stretch>
+            <a:fillRect/>
+          </a:stretch>
+        </p:blipFill>
+        <p:spPr>
+          <a:xfrm>
+            <a:off x="4208918" y="2193925"/>
+            <a:ext cx="3774164" cy="4024313"/>
+          </a:xfrm>
+        </p:spPr>
+      </p:pic>
+    </p:spTree>
+    <p:extLst>
+      <p:ext uri="{BB962C8B-B14F-4D97-AF65-F5344CB8AC3E}">
+        <p14:creationId xmlns:p14="http://schemas.microsoft.com/office/powerpoint/2010/main" val="1865641870"/>
+      </p:ext>
+    </p:extLst>
+  </p:cSld>
+  <p:clrMapOvr>
+    <a:masterClrMapping/>
+  </p:clrMapOvr>
+</p:sld>
+</file>
+
+<file path=ppt/slides/slide18.xml><?xml version="1.0" encoding="utf-8"?>
+<p:sld xmlns:a="http://schemas.openxmlformats.org/drawingml/2006/main" xmlns:r="http://schemas.openxmlformats.org/officeDocument/2006/relationships" xmlns:p="http://schemas.openxmlformats.org/presentationml/2006/main">
+  <p:cSld>
+    <p:spTree>
+      <p:nvGrpSpPr>
+        <p:cNvPr id="1" name=""/>
+        <p:cNvGrpSpPr/>
+        <p:nvPr/>
+      </p:nvGrpSpPr>
+      <p:grpSpPr>
+        <a:xfrm>
+          <a:off x="0" y="0"/>
+          <a:ext cx="0" cy="0"/>
+          <a:chOff x="0" y="0"/>
+          <a:chExt cx="0" cy="0"/>
+        </a:xfrm>
+      </p:grpSpPr>
+      <p:sp>
+        <p:nvSpPr>
+          <p:cNvPr id="2" name="Title 1">
+            <a:extLst>
+              <a:ext uri="{FF2B5EF4-FFF2-40B4-BE49-F238E27FC236}">
                 <a16:creationId xmlns:a16="http://schemas.microsoft.com/office/drawing/2014/main" id="{7953D227-8F76-4906-9705-BE008010AE04}"/>
               </a:ext>
             </a:extLst>

</xml_diff>